<commit_message>
new fsm inserted in README
</commit_message>
<xml_diff>
--- a/FSM-docs/cmd_fsm.pptx
+++ b/FSM-docs/cmd_fsm.pptx
@@ -288,7 +288,7 @@
           <a:p>
             <a:fld id="{64126DEB-FF07-2F4D-99E6-C1CC7592DAC1}" type="datetimeFigureOut">
               <a:rPr lang="en-US" smtClean="0"/>
-              <a:t>5/3/14</a:t>
+              <a:t>5/4/14</a:t>
             </a:fld>
             <a:endParaRPr lang="en-US"/>
           </a:p>
@@ -458,7 +458,7 @@
           <a:p>
             <a:fld id="{64126DEB-FF07-2F4D-99E6-C1CC7592DAC1}" type="datetimeFigureOut">
               <a:rPr lang="en-US" smtClean="0"/>
-              <a:t>5/3/14</a:t>
+              <a:t>5/4/14</a:t>
             </a:fld>
             <a:endParaRPr lang="en-US"/>
           </a:p>
@@ -638,7 +638,7 @@
           <a:p>
             <a:fld id="{64126DEB-FF07-2F4D-99E6-C1CC7592DAC1}" type="datetimeFigureOut">
               <a:rPr lang="en-US" smtClean="0"/>
-              <a:t>5/3/14</a:t>
+              <a:t>5/4/14</a:t>
             </a:fld>
             <a:endParaRPr lang="en-US"/>
           </a:p>
@@ -808,7 +808,7 @@
           <a:p>
             <a:fld id="{64126DEB-FF07-2F4D-99E6-C1CC7592DAC1}" type="datetimeFigureOut">
               <a:rPr lang="en-US" smtClean="0"/>
-              <a:t>5/3/14</a:t>
+              <a:t>5/4/14</a:t>
             </a:fld>
             <a:endParaRPr lang="en-US"/>
           </a:p>
@@ -1054,7 +1054,7 @@
           <a:p>
             <a:fld id="{64126DEB-FF07-2F4D-99E6-C1CC7592DAC1}" type="datetimeFigureOut">
               <a:rPr lang="en-US" smtClean="0"/>
-              <a:t>5/3/14</a:t>
+              <a:t>5/4/14</a:t>
             </a:fld>
             <a:endParaRPr lang="en-US"/>
           </a:p>
@@ -1342,7 +1342,7 @@
           <a:p>
             <a:fld id="{64126DEB-FF07-2F4D-99E6-C1CC7592DAC1}" type="datetimeFigureOut">
               <a:rPr lang="en-US" smtClean="0"/>
-              <a:t>5/3/14</a:t>
+              <a:t>5/4/14</a:t>
             </a:fld>
             <a:endParaRPr lang="en-US"/>
           </a:p>
@@ -1769,7 +1769,7 @@
           <a:p>
             <a:fld id="{64126DEB-FF07-2F4D-99E6-C1CC7592DAC1}" type="datetimeFigureOut">
               <a:rPr lang="en-US" smtClean="0"/>
-              <a:t>5/3/14</a:t>
+              <a:t>5/4/14</a:t>
             </a:fld>
             <a:endParaRPr lang="en-US"/>
           </a:p>
@@ -1887,7 +1887,7 @@
           <a:p>
             <a:fld id="{64126DEB-FF07-2F4D-99E6-C1CC7592DAC1}" type="datetimeFigureOut">
               <a:rPr lang="en-US" smtClean="0"/>
-              <a:t>5/3/14</a:t>
+              <a:t>5/4/14</a:t>
             </a:fld>
             <a:endParaRPr lang="en-US"/>
           </a:p>
@@ -1982,7 +1982,7 @@
           <a:p>
             <a:fld id="{64126DEB-FF07-2F4D-99E6-C1CC7592DAC1}" type="datetimeFigureOut">
               <a:rPr lang="en-US" smtClean="0"/>
-              <a:t>5/3/14</a:t>
+              <a:t>5/4/14</a:t>
             </a:fld>
             <a:endParaRPr lang="en-US"/>
           </a:p>
@@ -2259,7 +2259,7 @@
           <a:p>
             <a:fld id="{64126DEB-FF07-2F4D-99E6-C1CC7592DAC1}" type="datetimeFigureOut">
               <a:rPr lang="en-US" smtClean="0"/>
-              <a:t>5/3/14</a:t>
+              <a:t>5/4/14</a:t>
             </a:fld>
             <a:endParaRPr lang="en-US"/>
           </a:p>
@@ -2512,7 +2512,7 @@
           <a:p>
             <a:fld id="{64126DEB-FF07-2F4D-99E6-C1CC7592DAC1}" type="datetimeFigureOut">
               <a:rPr lang="en-US" smtClean="0"/>
-              <a:t>5/3/14</a:t>
+              <a:t>5/4/14</a:t>
             </a:fld>
             <a:endParaRPr lang="en-US"/>
           </a:p>
@@ -2725,7 +2725,7 @@
           <a:p>
             <a:fld id="{64126DEB-FF07-2F4D-99E6-C1CC7592DAC1}" type="datetimeFigureOut">
               <a:rPr lang="en-US" smtClean="0"/>
-              <a:t>5/3/14</a:t>
+              <a:t>5/4/14</a:t>
             </a:fld>
             <a:endParaRPr lang="en-US"/>
           </a:p>
@@ -3313,7 +3313,6 @@
               <a:rPr lang="en-US" sz="1600" dirty="0" smtClean="0"/>
               <a:t>status</a:t>
             </a:r>
-            <a:endParaRPr lang="en-US" sz="1600" dirty="0" smtClean="0"/>
           </a:p>
           <a:p>
             <a:r>
@@ -3859,11 +3858,6 @@
               </a:rPr>
               <a:t>12</a:t>
             </a:r>
-            <a:endParaRPr lang="en-US" sz="1800" dirty="0" smtClean="0">
-              <a:solidFill>
-                <a:schemeClr val="tx1"/>
-              </a:solidFill>
-            </a:endParaRPr>
           </a:p>
         </p:txBody>
       </p:sp>
@@ -3911,11 +3905,6 @@
               </a:rPr>
               <a:t>11</a:t>
             </a:r>
-            <a:endParaRPr lang="en-US" sz="1800" dirty="0" smtClean="0">
-              <a:solidFill>
-                <a:schemeClr val="tx1"/>
-              </a:solidFill>
-            </a:endParaRPr>
           </a:p>
         </p:txBody>
       </p:sp>
@@ -4068,7 +4057,7 @@
         </p:nvSpPr>
         <p:spPr>
           <a:xfrm>
-            <a:off x="2552700" y="19320080"/>
+            <a:off x="2331467" y="12264426"/>
             <a:ext cx="639132" cy="621420"/>
           </a:xfrm>
           <a:prstGeom prst="ellipse">
@@ -4102,8 +4091,13 @@
                   <a:schemeClr val="tx1"/>
                 </a:solidFill>
               </a:rPr>
-              <a:t>25</a:t>
-            </a:r>
+              <a:t>13</a:t>
+            </a:r>
+            <a:endParaRPr lang="en-US" sz="1800" dirty="0" smtClean="0">
+              <a:solidFill>
+                <a:schemeClr val="tx1"/>
+              </a:solidFill>
+            </a:endParaRPr>
           </a:p>
         </p:txBody>
       </p:sp>
@@ -4115,7 +4109,7 @@
         </p:nvSpPr>
         <p:spPr>
           <a:xfrm>
-            <a:off x="7085136" y="19320080"/>
+            <a:off x="6863903" y="12264426"/>
             <a:ext cx="639132" cy="621420"/>
           </a:xfrm>
           <a:prstGeom prst="ellipse">
@@ -4149,8 +4143,13 @@
                   <a:schemeClr val="tx1"/>
                 </a:solidFill>
               </a:rPr>
-              <a:t>28</a:t>
-            </a:r>
+              <a:t>16</a:t>
+            </a:r>
+            <a:endParaRPr lang="en-US" sz="1800" dirty="0" smtClean="0">
+              <a:solidFill>
+                <a:schemeClr val="tx1"/>
+              </a:solidFill>
+            </a:endParaRPr>
           </a:p>
         </p:txBody>
       </p:sp>
@@ -4162,7 +4161,7 @@
         </p:nvSpPr>
         <p:spPr>
           <a:xfrm>
-            <a:off x="5574324" y="19320080"/>
+            <a:off x="5353091" y="12264426"/>
             <a:ext cx="639132" cy="621420"/>
           </a:xfrm>
           <a:prstGeom prst="ellipse">
@@ -4196,8 +4195,13 @@
                   <a:schemeClr val="tx1"/>
                 </a:solidFill>
               </a:rPr>
-              <a:t>27</a:t>
-            </a:r>
+              <a:t>15</a:t>
+            </a:r>
+            <a:endParaRPr lang="en-US" sz="1800" dirty="0" smtClean="0">
+              <a:solidFill>
+                <a:schemeClr val="tx1"/>
+              </a:solidFill>
+            </a:endParaRPr>
           </a:p>
         </p:txBody>
       </p:sp>
@@ -4980,7 +4984,7 @@
         </p:nvSpPr>
         <p:spPr>
           <a:xfrm>
-            <a:off x="4063512" y="19320080"/>
+            <a:off x="3842279" y="12264426"/>
             <a:ext cx="639132" cy="621420"/>
           </a:xfrm>
           <a:prstGeom prst="ellipse">
@@ -5014,8 +5018,13 @@
                   <a:schemeClr val="tx1"/>
                 </a:solidFill>
               </a:rPr>
-              <a:t>26</a:t>
-            </a:r>
+              <a:t>14</a:t>
+            </a:r>
+            <a:endParaRPr lang="en-US" sz="1800" dirty="0" smtClean="0">
+              <a:solidFill>
+                <a:schemeClr val="tx1"/>
+              </a:solidFill>
+            </a:endParaRPr>
           </a:p>
         </p:txBody>
       </p:sp>
@@ -5027,7 +5036,7 @@
         </p:nvSpPr>
         <p:spPr>
           <a:xfrm>
-            <a:off x="8595948" y="19320080"/>
+            <a:off x="8374715" y="12264426"/>
             <a:ext cx="639132" cy="621420"/>
           </a:xfrm>
           <a:prstGeom prst="ellipse">
@@ -5061,8 +5070,13 @@
                   <a:schemeClr val="tx1"/>
                 </a:solidFill>
               </a:rPr>
-              <a:t>29</a:t>
-            </a:r>
+              <a:t>17</a:t>
+            </a:r>
+            <a:endParaRPr lang="en-US" sz="1800" dirty="0" smtClean="0">
+              <a:solidFill>
+                <a:schemeClr val="tx1"/>
+              </a:solidFill>
+            </a:endParaRPr>
           </a:p>
         </p:txBody>
       </p:sp>
@@ -5074,7 +5088,7 @@
         </p:nvSpPr>
         <p:spPr>
           <a:xfrm>
-            <a:off x="10106760" y="19320080"/>
+            <a:off x="9885527" y="12264426"/>
             <a:ext cx="639132" cy="621420"/>
           </a:xfrm>
           <a:prstGeom prst="ellipse">
@@ -5108,8 +5122,13 @@
                   <a:schemeClr val="tx1"/>
                 </a:solidFill>
               </a:rPr>
-              <a:t>30</a:t>
-            </a:r>
+              <a:t>18</a:t>
+            </a:r>
+            <a:endParaRPr lang="en-US" sz="1800" dirty="0" smtClean="0">
+              <a:solidFill>
+                <a:schemeClr val="tx1"/>
+              </a:solidFill>
+            </a:endParaRPr>
           </a:p>
         </p:txBody>
       </p:sp>
@@ -5121,7 +5140,7 @@
         </p:nvSpPr>
         <p:spPr>
           <a:xfrm>
-            <a:off x="11617571" y="19320080"/>
+            <a:off x="11396338" y="12264426"/>
             <a:ext cx="639132" cy="621420"/>
           </a:xfrm>
           <a:prstGeom prst="ellipse">
@@ -5155,8 +5174,13 @@
                   <a:schemeClr val="tx1"/>
                 </a:solidFill>
               </a:rPr>
-              <a:t>31</a:t>
-            </a:r>
+              <a:t>19</a:t>
+            </a:r>
+            <a:endParaRPr lang="en-US" sz="1800" dirty="0" smtClean="0">
+              <a:solidFill>
+                <a:schemeClr val="tx1"/>
+              </a:solidFill>
+            </a:endParaRPr>
           </a:p>
         </p:txBody>
       </p:sp>
@@ -5170,8 +5194,8 @@
         </p:nvCxnSpPr>
         <p:spPr>
           <a:xfrm rot="16200000" flipH="1">
-            <a:off x="233740" y="17311829"/>
-            <a:ext cx="3480155" cy="1157766"/>
+            <a:off x="-899351" y="9344318"/>
+            <a:ext cx="5550500" cy="911135"/>
           </a:xfrm>
           <a:prstGeom prst="bentConnector2">
             <a:avLst/>
@@ -5206,7 +5230,7 @@
         </p:nvCxnSpPr>
         <p:spPr>
           <a:xfrm>
-            <a:off x="3191832" y="19630790"/>
+            <a:off x="2970599" y="12575136"/>
             <a:ext cx="871680" cy="0"/>
           </a:xfrm>
           <a:prstGeom prst="straightConnector1">
@@ -5242,7 +5266,7 @@
         </p:nvCxnSpPr>
         <p:spPr>
           <a:xfrm>
-            <a:off x="4702644" y="19630790"/>
+            <a:off x="4481411" y="12575136"/>
             <a:ext cx="871680" cy="0"/>
           </a:xfrm>
           <a:prstGeom prst="straightConnector1">
@@ -5278,7 +5302,7 @@
         </p:nvCxnSpPr>
         <p:spPr>
           <a:xfrm>
-            <a:off x="6213456" y="19630790"/>
+            <a:off x="5992223" y="12575136"/>
             <a:ext cx="871680" cy="0"/>
           </a:xfrm>
           <a:prstGeom prst="straightConnector1">
@@ -5314,7 +5338,7 @@
         </p:nvCxnSpPr>
         <p:spPr>
           <a:xfrm>
-            <a:off x="7724268" y="19630790"/>
+            <a:off x="7503035" y="12575136"/>
             <a:ext cx="871680" cy="0"/>
           </a:xfrm>
           <a:prstGeom prst="straightConnector1">
@@ -5350,7 +5374,7 @@
         </p:nvCxnSpPr>
         <p:spPr>
           <a:xfrm>
-            <a:off x="9235080" y="19630790"/>
+            <a:off x="9013847" y="12575136"/>
             <a:ext cx="871680" cy="0"/>
           </a:xfrm>
           <a:prstGeom prst="straightConnector1">
@@ -5386,7 +5410,7 @@
         </p:nvCxnSpPr>
         <p:spPr>
           <a:xfrm>
-            <a:off x="10745892" y="19630790"/>
+            <a:off x="10524659" y="12575136"/>
             <a:ext cx="871679" cy="0"/>
           </a:xfrm>
           <a:prstGeom prst="straightConnector1">
@@ -5419,7 +5443,7 @@
         </p:nvSpPr>
         <p:spPr>
           <a:xfrm>
-            <a:off x="3333734" y="19291973"/>
+            <a:off x="3112501" y="12236319"/>
             <a:ext cx="468798" cy="338554"/>
           </a:xfrm>
           <a:prstGeom prst="rect">
@@ -5449,7 +5473,7 @@
         </p:nvSpPr>
         <p:spPr>
           <a:xfrm>
-            <a:off x="4872660" y="19279010"/>
+            <a:off x="4651427" y="12223356"/>
             <a:ext cx="468798" cy="338554"/>
           </a:xfrm>
           <a:prstGeom prst="rect">
@@ -5479,7 +5503,7 @@
         </p:nvSpPr>
         <p:spPr>
           <a:xfrm>
-            <a:off x="6409273" y="19270393"/>
+            <a:off x="6188040" y="12214739"/>
             <a:ext cx="468798" cy="338554"/>
           </a:xfrm>
           <a:prstGeom prst="rect">
@@ -5509,7 +5533,7 @@
         </p:nvSpPr>
         <p:spPr>
           <a:xfrm>
-            <a:off x="7905917" y="19270130"/>
+            <a:off x="7684684" y="12214476"/>
             <a:ext cx="468798" cy="338554"/>
           </a:xfrm>
           <a:prstGeom prst="rect">
@@ -5539,7 +5563,7 @@
         </p:nvSpPr>
         <p:spPr>
           <a:xfrm>
-            <a:off x="9481308" y="19320080"/>
+            <a:off x="9260075" y="12264426"/>
             <a:ext cx="468798" cy="338554"/>
           </a:xfrm>
           <a:prstGeom prst="rect">
@@ -5569,7 +5593,7 @@
         </p:nvSpPr>
         <p:spPr>
           <a:xfrm>
-            <a:off x="10927391" y="19291973"/>
+            <a:off x="10706158" y="12236319"/>
             <a:ext cx="468798" cy="338554"/>
           </a:xfrm>
           <a:prstGeom prst="rect">
@@ -5593,21 +5617,19 @@
       </p:sp>
       <p:sp>
         <p:nvSpPr>
-          <p:cNvPr id="156" name="TextBox 155"/>
+          <p:cNvPr id="157" name="TextBox 156"/>
           <p:cNvSpPr txBox="1"/>
           <p:nvPr/>
         </p:nvSpPr>
         <p:spPr>
           <a:xfrm>
-            <a:off x="11575739" y="18604751"/>
-            <a:ext cx="748322" cy="584776"/>
+            <a:off x="1532679" y="12214476"/>
+            <a:ext cx="435736" cy="338554"/>
           </a:xfrm>
           <a:prstGeom prst="rect">
             <a:avLst/>
           </a:prstGeom>
-          <a:solidFill>
-            <a:schemeClr val="bg1"/>
-          </a:solidFill>
+          <a:noFill/>
         </p:spPr>
         <p:txBody>
           <a:bodyPr wrap="none" rtlCol="0">
@@ -5618,18 +5640,7 @@
             <a:pPr algn="ctr"/>
             <a:r>
               <a:rPr lang="en-US" sz="1600" dirty="0" smtClean="0"/>
-              <a:t>INT</a:t>
-            </a:r>
-          </a:p>
-          <a:p>
-            <a:pPr algn="ctr"/>
-            <a:r>
-              <a:rPr lang="en-US" sz="1600" dirty="0"/>
-              <a:t>q</a:t>
-            </a:r>
-            <a:r>
-              <a:rPr lang="en-US" sz="1600" dirty="0" smtClean="0"/>
-              <a:t>uit(q)</a:t>
+              <a:t>set</a:t>
             </a:r>
             <a:endParaRPr lang="en-US" sz="1600" dirty="0"/>
           </a:p>
@@ -5637,14 +5648,14 @@
       </p:sp>
       <p:sp>
         <p:nvSpPr>
-          <p:cNvPr id="157" name="TextBox 156"/>
+          <p:cNvPr id="158" name="TextBox 157"/>
           <p:cNvSpPr txBox="1"/>
           <p:nvPr/>
         </p:nvSpPr>
         <p:spPr>
           <a:xfrm>
-            <a:off x="1753912" y="19270130"/>
-            <a:ext cx="435736" cy="338554"/>
+            <a:off x="9125111" y="12580559"/>
+            <a:ext cx="530915" cy="307777"/>
           </a:xfrm>
           <a:prstGeom prst="rect">
             <a:avLst/>
@@ -5657,25 +5668,24 @@
           </a:bodyPr>
           <a:lstStyle/>
           <a:p>
-            <a:pPr algn="ctr"/>
-            <a:r>
-              <a:rPr lang="en-US" sz="1600" dirty="0" smtClean="0"/>
-              <a:t>set</a:t>
-            </a:r>
-            <a:endParaRPr lang="en-US" sz="1600" dirty="0"/>
-          </a:p>
-        </p:txBody>
-      </p:sp>
-      <p:sp>
-        <p:nvSpPr>
-          <p:cNvPr id="158" name="TextBox 157"/>
+            <a:r>
+              <a:rPr lang="en-US" sz="1400" dirty="0" smtClean="0"/>
+              <a:t>hour</a:t>
+            </a:r>
+            <a:endParaRPr lang="en-US" sz="1400" dirty="0"/>
+          </a:p>
+        </p:txBody>
+      </p:sp>
+      <p:sp>
+        <p:nvSpPr>
+          <p:cNvPr id="159" name="TextBox 158"/>
           <p:cNvSpPr txBox="1"/>
           <p:nvPr/>
         </p:nvSpPr>
         <p:spPr>
           <a:xfrm>
-            <a:off x="9346344" y="19636213"/>
-            <a:ext cx="530915" cy="307777"/>
+            <a:off x="10524659" y="12580559"/>
+            <a:ext cx="777627" cy="307777"/>
           </a:xfrm>
           <a:prstGeom prst="rect">
             <a:avLst/>
@@ -5690,7 +5700,7 @@
           <a:p>
             <a:r>
               <a:rPr lang="en-US" sz="1400" dirty="0" smtClean="0"/>
-              <a:t>hour</a:t>
+              <a:t>minutes</a:t>
             </a:r>
             <a:endParaRPr lang="en-US" sz="1400" dirty="0"/>
           </a:p>
@@ -5698,14 +5708,14 @@
       </p:sp>
       <p:sp>
         <p:nvSpPr>
-          <p:cNvPr id="159" name="TextBox 158"/>
+          <p:cNvPr id="160" name="TextBox 159"/>
           <p:cNvSpPr txBox="1"/>
           <p:nvPr/>
         </p:nvSpPr>
         <p:spPr>
           <a:xfrm>
-            <a:off x="10745892" y="19636213"/>
-            <a:ext cx="777627" cy="307777"/>
+            <a:off x="7681343" y="12602980"/>
+            <a:ext cx="505267" cy="307777"/>
           </a:xfrm>
           <a:prstGeom prst="rect">
             <a:avLst/>
@@ -5719,8 +5729,8 @@
           <a:lstStyle/>
           <a:p>
             <a:r>
-              <a:rPr lang="en-US" sz="1400" dirty="0" smtClean="0"/>
-              <a:t>minutes</a:t>
+              <a:rPr lang="en-US" sz="1400" dirty="0" err="1" smtClean="0"/>
+              <a:t>dow</a:t>
             </a:r>
             <a:endParaRPr lang="en-US" sz="1400" dirty="0"/>
           </a:p>
@@ -5728,14 +5738,14 @@
       </p:sp>
       <p:sp>
         <p:nvSpPr>
-          <p:cNvPr id="160" name="TextBox 159"/>
+          <p:cNvPr id="161" name="TextBox 160"/>
           <p:cNvSpPr txBox="1"/>
           <p:nvPr/>
         </p:nvSpPr>
         <p:spPr>
           <a:xfrm>
-            <a:off x="7902576" y="19658634"/>
-            <a:ext cx="505267" cy="307777"/>
+            <a:off x="6143533" y="12600102"/>
+            <a:ext cx="518091" cy="307777"/>
           </a:xfrm>
           <a:prstGeom prst="rect">
             <a:avLst/>
@@ -5749,8 +5759,8 @@
           <a:lstStyle/>
           <a:p>
             <a:r>
-              <a:rPr lang="en-US" sz="1400" dirty="0" err="1" smtClean="0"/>
-              <a:t>dow</a:t>
+              <a:rPr lang="en-US" sz="1400" dirty="0" smtClean="0"/>
+              <a:t>date</a:t>
             </a:r>
             <a:endParaRPr lang="en-US" sz="1400" dirty="0"/>
           </a:p>
@@ -5758,14 +5768,14 @@
       </p:sp>
       <p:sp>
         <p:nvSpPr>
-          <p:cNvPr id="161" name="TextBox 160"/>
+          <p:cNvPr id="162" name="TextBox 161"/>
           <p:cNvSpPr txBox="1"/>
           <p:nvPr/>
         </p:nvSpPr>
         <p:spPr>
           <a:xfrm>
-            <a:off x="6364766" y="19655756"/>
-            <a:ext cx="518091" cy="307777"/>
+            <a:off x="4585969" y="12603081"/>
+            <a:ext cx="671553" cy="307777"/>
           </a:xfrm>
           <a:prstGeom prst="rect">
             <a:avLst/>
@@ -5780,7 +5790,7 @@
           <a:p>
             <a:r>
               <a:rPr lang="en-US" sz="1400" dirty="0" smtClean="0"/>
-              <a:t>date</a:t>
+              <a:t>month</a:t>
             </a:r>
             <a:endParaRPr lang="en-US" sz="1400" dirty="0"/>
           </a:p>
@@ -5788,14 +5798,14 @@
       </p:sp>
       <p:sp>
         <p:nvSpPr>
-          <p:cNvPr id="162" name="TextBox 161"/>
+          <p:cNvPr id="163" name="TextBox 162"/>
           <p:cNvSpPr txBox="1"/>
           <p:nvPr/>
         </p:nvSpPr>
         <p:spPr>
           <a:xfrm>
-            <a:off x="4807202" y="19658735"/>
-            <a:ext cx="671553" cy="307777"/>
+            <a:off x="3119256" y="12603081"/>
+            <a:ext cx="505267" cy="307777"/>
           </a:xfrm>
           <a:prstGeom prst="rect">
             <a:avLst/>
@@ -5810,36 +5820,6 @@
           <a:p>
             <a:r>
               <a:rPr lang="en-US" sz="1400" dirty="0" smtClean="0"/>
-              <a:t>month</a:t>
-            </a:r>
-            <a:endParaRPr lang="en-US" sz="1400" dirty="0"/>
-          </a:p>
-        </p:txBody>
-      </p:sp>
-      <p:sp>
-        <p:nvSpPr>
-          <p:cNvPr id="163" name="TextBox 162"/>
-          <p:cNvSpPr txBox="1"/>
-          <p:nvPr/>
-        </p:nvSpPr>
-        <p:spPr>
-          <a:xfrm>
-            <a:off x="3340489" y="19658735"/>
-            <a:ext cx="505267" cy="307777"/>
-          </a:xfrm>
-          <a:prstGeom prst="rect">
-            <a:avLst/>
-          </a:prstGeom>
-          <a:noFill/>
-        </p:spPr>
-        <p:txBody>
-          <a:bodyPr wrap="none" rtlCol="0">
-            <a:spAutoFit/>
-          </a:bodyPr>
-          <a:lstStyle/>
-          <a:p>
-            <a:r>
-              <a:rPr lang="en-US" sz="1400" dirty="0" smtClean="0"/>
               <a:t>year</a:t>
             </a:r>
             <a:endParaRPr lang="en-US" sz="1400" dirty="0"/>
@@ -5854,7 +5834,7 @@
         </p:nvSpPr>
         <p:spPr>
           <a:xfrm>
-            <a:off x="10955795" y="18716272"/>
+            <a:off x="10734562" y="11660618"/>
             <a:ext cx="773682" cy="307777"/>
           </a:xfrm>
           <a:prstGeom prst="rect">
@@ -6659,34 +6639,23 @@
               <a:rPr lang="en-US" sz="1600" dirty="0" smtClean="0"/>
               <a:t>system</a:t>
             </a:r>
-            <a:endParaRPr lang="en-US" sz="1600" dirty="0" smtClean="0"/>
           </a:p>
           <a:p>
             <a:r>
               <a:rPr lang="en-US" sz="1600" dirty="0" smtClean="0"/>
               <a:t>status</a:t>
             </a:r>
-            <a:endParaRPr lang="en-US" sz="1600" dirty="0" smtClean="0"/>
           </a:p>
           <a:p>
             <a:r>
               <a:rPr lang="en-US" sz="1600" dirty="0" smtClean="0"/>
               <a:t>Time</a:t>
             </a:r>
-            <a:endParaRPr lang="en-US" sz="1600" dirty="0" smtClean="0"/>
           </a:p>
           <a:p>
             <a:r>
               <a:rPr lang="en-US" sz="1600" dirty="0" smtClean="0"/>
-              <a:t>help</a:t>
-            </a:r>
-            <a:r>
-              <a:rPr lang="en-US" sz="1600" dirty="0" smtClean="0"/>
-              <a:t>(?</a:t>
-            </a:r>
-            <a:r>
-              <a:rPr lang="en-US" sz="1600" dirty="0" smtClean="0"/>
-              <a:t>)</a:t>
+              <a:t>help(?)</a:t>
             </a:r>
           </a:p>
           <a:p>
@@ -6694,7 +6663,6 @@
               <a:rPr lang="en-US" sz="1600" dirty="0" smtClean="0"/>
               <a:t>quit</a:t>
             </a:r>
-            <a:endParaRPr lang="en-US" sz="1600" dirty="0" smtClean="0"/>
           </a:p>
           <a:p>
             <a:r>
@@ -6967,39 +6935,6 @@
       </p:sp>
       <p:sp>
         <p:nvSpPr>
-          <p:cNvPr id="268" name="TextBox 267"/>
-          <p:cNvSpPr txBox="1"/>
-          <p:nvPr/>
-        </p:nvSpPr>
-        <p:spPr>
-          <a:xfrm>
-            <a:off x="1888976" y="8727083"/>
-            <a:ext cx="510376" cy="338554"/>
-          </a:xfrm>
-          <a:prstGeom prst="rect">
-            <a:avLst/>
-          </a:prstGeom>
-          <a:solidFill>
-            <a:srgbClr val="FFFFFF"/>
-          </a:solidFill>
-        </p:spPr>
-        <p:txBody>
-          <a:bodyPr wrap="none" rtlCol="0">
-            <a:spAutoFit/>
-          </a:bodyPr>
-          <a:lstStyle/>
-          <a:p>
-            <a:pPr algn="ctr"/>
-            <a:r>
-              <a:rPr lang="en-US" sz="1600" dirty="0" smtClean="0"/>
-              <a:t>edit</a:t>
-            </a:r>
-            <a:endParaRPr lang="en-US" sz="1600" dirty="0"/>
-          </a:p>
-        </p:txBody>
-      </p:sp>
-      <p:sp>
-        <p:nvSpPr>
           <p:cNvPr id="272" name="TextBox 271"/>
           <p:cNvSpPr txBox="1"/>
           <p:nvPr/>
@@ -7739,8 +7674,8 @@
         </p:nvCxnSpPr>
         <p:spPr>
           <a:xfrm flipH="1">
-            <a:off x="1394934" y="7244341"/>
-            <a:ext cx="1328708" cy="1033750"/>
+            <a:off x="2192364" y="7244341"/>
+            <a:ext cx="531278" cy="1045947"/>
           </a:xfrm>
           <a:prstGeom prst="line">
             <a:avLst/>
@@ -7770,14 +7705,12 @@
           <p:nvPr/>
         </p:nvCxnSpPr>
         <p:spPr>
-          <a:xfrm>
-            <a:off x="1394934" y="8290288"/>
-            <a:ext cx="1246655" cy="790907"/>
-          </a:xfrm>
-          <a:prstGeom prst="bentConnector3">
-            <a:avLst>
-              <a:gd name="adj1" fmla="val -12"/>
-            </a:avLst>
+          <a:xfrm rot="16200000" flipH="1">
+            <a:off x="2021523" y="8461128"/>
+            <a:ext cx="790907" cy="449225"/>
+          </a:xfrm>
+          <a:prstGeom prst="bentConnector2">
+            <a:avLst/>
           </a:prstGeom>
           <a:ln>
             <a:tailEnd type="arrow"/>
@@ -7863,6 +7796,120 @@
           </a:fontRef>
         </p:style>
       </p:cxnSp>
+      <p:cxnSp>
+        <p:nvCxnSpPr>
+          <p:cNvPr id="7" name="Elbow Connector 6"/>
+          <p:cNvCxnSpPr>
+            <a:stCxn id="141" idx="0"/>
+          </p:cNvCxnSpPr>
+          <p:nvPr/>
+        </p:nvCxnSpPr>
+        <p:spPr>
+          <a:xfrm rot="16200000" flipV="1">
+            <a:off x="5215482" y="5764003"/>
+            <a:ext cx="11876742" cy="1124103"/>
+          </a:xfrm>
+          <a:prstGeom prst="bentConnector3">
+            <a:avLst>
+              <a:gd name="adj1" fmla="val 99639"/>
+            </a:avLst>
+          </a:prstGeom>
+          <a:ln>
+            <a:tailEnd type="arrow"/>
+          </a:ln>
+        </p:spPr>
+        <p:style>
+          <a:lnRef idx="2">
+            <a:schemeClr val="accent1"/>
+          </a:lnRef>
+          <a:fillRef idx="0">
+            <a:schemeClr val="accent1"/>
+          </a:fillRef>
+          <a:effectRef idx="1">
+            <a:schemeClr val="accent1"/>
+          </a:effectRef>
+          <a:fontRef idx="minor">
+            <a:schemeClr val="tx1"/>
+          </a:fontRef>
+        </p:style>
+      </p:cxnSp>
+      <p:sp>
+        <p:nvSpPr>
+          <p:cNvPr id="156" name="TextBox 155"/>
+          <p:cNvSpPr txBox="1"/>
+          <p:nvPr/>
+        </p:nvSpPr>
+        <p:spPr>
+          <a:xfrm>
+            <a:off x="11354506" y="11549097"/>
+            <a:ext cx="748322" cy="584776"/>
+          </a:xfrm>
+          <a:prstGeom prst="rect">
+            <a:avLst/>
+          </a:prstGeom>
+          <a:solidFill>
+            <a:schemeClr val="bg1"/>
+          </a:solidFill>
+        </p:spPr>
+        <p:txBody>
+          <a:bodyPr wrap="none" rtlCol="0">
+            <a:spAutoFit/>
+          </a:bodyPr>
+          <a:lstStyle/>
+          <a:p>
+            <a:pPr algn="ctr"/>
+            <a:r>
+              <a:rPr lang="en-US" sz="1600" dirty="0" smtClean="0"/>
+              <a:t>INT</a:t>
+            </a:r>
+          </a:p>
+          <a:p>
+            <a:pPr algn="ctr"/>
+            <a:r>
+              <a:rPr lang="en-US" sz="1600" dirty="0"/>
+              <a:t>q</a:t>
+            </a:r>
+            <a:r>
+              <a:rPr lang="en-US" sz="1600" dirty="0" smtClean="0"/>
+              <a:t>uit(q)</a:t>
+            </a:r>
+            <a:endParaRPr lang="en-US" sz="1600" dirty="0"/>
+          </a:p>
+        </p:txBody>
+      </p:sp>
+      <p:sp>
+        <p:nvSpPr>
+          <p:cNvPr id="268" name="TextBox 267"/>
+          <p:cNvSpPr txBox="1"/>
+          <p:nvPr/>
+        </p:nvSpPr>
+        <p:spPr>
+          <a:xfrm>
+            <a:off x="1929080" y="8473091"/>
+            <a:ext cx="510376" cy="338554"/>
+          </a:xfrm>
+          <a:prstGeom prst="rect">
+            <a:avLst/>
+          </a:prstGeom>
+          <a:solidFill>
+            <a:srgbClr val="FFFFFF"/>
+          </a:solidFill>
+        </p:spPr>
+        <p:txBody>
+          <a:bodyPr wrap="none" rtlCol="0">
+            <a:spAutoFit/>
+          </a:bodyPr>
+          <a:lstStyle/>
+          <a:p>
+            <a:pPr algn="ctr"/>
+            <a:r>
+              <a:rPr lang="en-US" sz="1600" dirty="0" smtClean="0"/>
+              <a:t>edit</a:t>
+            </a:r>
+            <a:endParaRPr lang="en-US" sz="1600" dirty="0"/>
+          </a:p>
+        </p:txBody>
+      </p:sp>
     </p:spTree>
     <p:extLst>
       <p:ext uri="{BB962C8B-B14F-4D97-AF65-F5344CB8AC3E}">

</xml_diff>